<commit_message>
modified slides for rmarkdown
</commit_message>
<xml_diff>
--- a/IB_group_meeting/R_special_features.pptx
+++ b/IB_group_meeting/R_special_features.pptx
@@ -5,7 +5,7 @@
     <p:sldMasterId id="2147483648" r:id="rId1"/>
   </p:sldMasterIdLst>
   <p:notesMasterIdLst>
-    <p:notesMasterId r:id="rId16"/>
+    <p:notesMasterId r:id="rId15"/>
   </p:notesMasterIdLst>
   <p:sldIdLst>
     <p:sldId id="256" r:id="rId2"/>
@@ -15,13 +15,12 @@
     <p:sldId id="261" r:id="rId6"/>
     <p:sldId id="259" r:id="rId7"/>
     <p:sldId id="263" r:id="rId8"/>
-    <p:sldId id="262" r:id="rId9"/>
-    <p:sldId id="265" r:id="rId10"/>
-    <p:sldId id="266" r:id="rId11"/>
-    <p:sldId id="267" r:id="rId12"/>
-    <p:sldId id="268" r:id="rId13"/>
-    <p:sldId id="269" r:id="rId14"/>
-    <p:sldId id="270" r:id="rId15"/>
+    <p:sldId id="265" r:id="rId9"/>
+    <p:sldId id="266" r:id="rId10"/>
+    <p:sldId id="267" r:id="rId11"/>
+    <p:sldId id="268" r:id="rId12"/>
+    <p:sldId id="269" r:id="rId13"/>
+    <p:sldId id="270" r:id="rId14"/>
   </p:sldIdLst>
   <p:sldSz cx="12192000" cy="6858000"/>
   <p:notesSz cx="6858000" cy="9144000"/>
@@ -305,7 +304,6 @@
               <a:rPr lang="en-US"/>
               <a:t>Fifth level</a:t>
             </a:r>
-            <a:endParaRPr lang="en-US"/>
           </a:p>
         </p:txBody>
       </p:sp>
@@ -534,15 +532,11 @@
           <a:p>
             <a:r>
               <a:rPr lang="en-US" baseline="0" dirty="0"/>
-              <a:t>Show a couple </a:t>
-            </a:r>
-            <a:r>
-              <a:rPr lang="en-US" baseline="0"/>
-              <a:t>live examples</a:t>
-            </a:r>
-          </a:p>
-          <a:p>
-            <a:endParaRPr lang="en-US"/>
+              <a:t>Show a couple live examples</a:t>
+            </a:r>
+          </a:p>
+          <a:p>
+            <a:endParaRPr lang="en-US" dirty="0"/>
           </a:p>
         </p:txBody>
       </p:sp>
@@ -711,7 +705,7 @@
           <a:p>
             <a:fld id="{18A3E1E4-0E0E-466C-9725-0FB18B8C2F46}" type="datetimeFigureOut">
               <a:rPr lang="en-US" smtClean="0"/>
-              <a:t>10/16/2017</a:t>
+              <a:t>10/17/2017</a:t>
             </a:fld>
             <a:endParaRPr lang="en-US"/>
           </a:p>
@@ -879,7 +873,7 @@
           <a:p>
             <a:fld id="{18A3E1E4-0E0E-466C-9725-0FB18B8C2F46}" type="datetimeFigureOut">
               <a:rPr lang="en-US" smtClean="0"/>
-              <a:t>10/16/2017</a:t>
+              <a:t>10/17/2017</a:t>
             </a:fld>
             <a:endParaRPr lang="en-US"/>
           </a:p>
@@ -1057,7 +1051,7 @@
           <a:p>
             <a:fld id="{18A3E1E4-0E0E-466C-9725-0FB18B8C2F46}" type="datetimeFigureOut">
               <a:rPr lang="en-US" smtClean="0"/>
-              <a:t>10/16/2017</a:t>
+              <a:t>10/17/2017</a:t>
             </a:fld>
             <a:endParaRPr lang="en-US"/>
           </a:p>
@@ -1225,7 +1219,7 @@
           <a:p>
             <a:fld id="{18A3E1E4-0E0E-466C-9725-0FB18B8C2F46}" type="datetimeFigureOut">
               <a:rPr lang="en-US" smtClean="0"/>
-              <a:t>10/16/2017</a:t>
+              <a:t>10/17/2017</a:t>
             </a:fld>
             <a:endParaRPr lang="en-US"/>
           </a:p>
@@ -1470,7 +1464,7 @@
           <a:p>
             <a:fld id="{18A3E1E4-0E0E-466C-9725-0FB18B8C2F46}" type="datetimeFigureOut">
               <a:rPr lang="en-US" smtClean="0"/>
-              <a:t>10/16/2017</a:t>
+              <a:t>10/17/2017</a:t>
             </a:fld>
             <a:endParaRPr lang="en-US"/>
           </a:p>
@@ -1699,7 +1693,7 @@
           <a:p>
             <a:fld id="{18A3E1E4-0E0E-466C-9725-0FB18B8C2F46}" type="datetimeFigureOut">
               <a:rPr lang="en-US" smtClean="0"/>
-              <a:t>10/16/2017</a:t>
+              <a:t>10/17/2017</a:t>
             </a:fld>
             <a:endParaRPr lang="en-US"/>
           </a:p>
@@ -2063,7 +2057,7 @@
           <a:p>
             <a:fld id="{18A3E1E4-0E0E-466C-9725-0FB18B8C2F46}" type="datetimeFigureOut">
               <a:rPr lang="en-US" smtClean="0"/>
-              <a:t>10/16/2017</a:t>
+              <a:t>10/17/2017</a:t>
             </a:fld>
             <a:endParaRPr lang="en-US"/>
           </a:p>
@@ -2180,7 +2174,7 @@
           <a:p>
             <a:fld id="{18A3E1E4-0E0E-466C-9725-0FB18B8C2F46}" type="datetimeFigureOut">
               <a:rPr lang="en-US" smtClean="0"/>
-              <a:t>10/16/2017</a:t>
+              <a:t>10/17/2017</a:t>
             </a:fld>
             <a:endParaRPr lang="en-US"/>
           </a:p>
@@ -2275,7 +2269,7 @@
           <a:p>
             <a:fld id="{18A3E1E4-0E0E-466C-9725-0FB18B8C2F46}" type="datetimeFigureOut">
               <a:rPr lang="en-US" smtClean="0"/>
-              <a:t>10/16/2017</a:t>
+              <a:t>10/17/2017</a:t>
             </a:fld>
             <a:endParaRPr lang="en-US"/>
           </a:p>
@@ -2550,7 +2544,7 @@
           <a:p>
             <a:fld id="{18A3E1E4-0E0E-466C-9725-0FB18B8C2F46}" type="datetimeFigureOut">
               <a:rPr lang="en-US" smtClean="0"/>
-              <a:t>10/16/2017</a:t>
+              <a:t>10/17/2017</a:t>
             </a:fld>
             <a:endParaRPr lang="en-US"/>
           </a:p>
@@ -2802,7 +2796,7 @@
           <a:p>
             <a:fld id="{18A3E1E4-0E0E-466C-9725-0FB18B8C2F46}" type="datetimeFigureOut">
               <a:rPr lang="en-US" smtClean="0"/>
-              <a:t>10/16/2017</a:t>
+              <a:t>10/17/2017</a:t>
             </a:fld>
             <a:endParaRPr lang="en-US"/>
           </a:p>
@@ -3013,7 +3007,7 @@
           <a:p>
             <a:fld id="{18A3E1E4-0E0E-466C-9725-0FB18B8C2F46}" type="datetimeFigureOut">
               <a:rPr lang="en-US" smtClean="0"/>
-              <a:t>10/16/2017</a:t>
+              <a:t>10/17/2017</a:t>
             </a:fld>
             <a:endParaRPr lang="en-US"/>
           </a:p>
@@ -3439,7 +3433,6 @@
               <a:rPr lang="en-US" dirty="0"/>
               <a:t>Leveraging special R features</a:t>
             </a:r>
-            <a:endParaRPr lang="en-US" dirty="0"/>
           </a:p>
         </p:txBody>
       </p:sp>
@@ -3487,106 +3480,6 @@
 </file>
 
 <file path=ppt/slides/slide10.xml><?xml version="1.0" encoding="utf-8"?>
-<p:sld xmlns:a="http://schemas.openxmlformats.org/drawingml/2006/main" xmlns:r="http://schemas.openxmlformats.org/officeDocument/2006/relationships" xmlns:p="http://schemas.openxmlformats.org/presentationml/2006/main">
-  <p:cSld>
-    <p:spTree>
-      <p:nvGrpSpPr>
-        <p:cNvPr id="1" name=""/>
-        <p:cNvGrpSpPr/>
-        <p:nvPr/>
-      </p:nvGrpSpPr>
-      <p:grpSpPr>
-        <a:xfrm>
-          <a:off x="0" y="0"/>
-          <a:ext cx="0" cy="0"/>
-          <a:chOff x="0" y="0"/>
-          <a:chExt cx="0" cy="0"/>
-        </a:xfrm>
-      </p:grpSpPr>
-      <p:sp>
-        <p:nvSpPr>
-          <p:cNvPr id="2" name="Title 1"/>
-          <p:cNvSpPr>
-            <a:spLocks noGrp="1"/>
-          </p:cNvSpPr>
-          <p:nvPr>
-            <p:ph type="title"/>
-          </p:nvPr>
-        </p:nvSpPr>
-        <p:spPr/>
-        <p:txBody>
-          <a:bodyPr/>
-          <a:lstStyle/>
-          <a:p>
-            <a:r>
-              <a:rPr lang="en-US" dirty="0"/>
-              <a:t>“</a:t>
-            </a:r>
-            <a:r>
-              <a:rPr lang="en-US" dirty="0" err="1"/>
-              <a:t>rticles</a:t>
-            </a:r>
-            <a:r>
-              <a:rPr lang="en-US" dirty="0"/>
-              <a:t>” installation – create first “</a:t>
-            </a:r>
-            <a:r>
-              <a:rPr lang="en-US" dirty="0" err="1"/>
-              <a:t>rticles</a:t>
-            </a:r>
-            <a:r>
-              <a:rPr lang="en-US" dirty="0"/>
-              <a:t> - </a:t>
-            </a:r>
-            <a:r>
-              <a:rPr lang="en-US" dirty="0" err="1"/>
-              <a:t>jss</a:t>
-            </a:r>
-            <a:r>
-              <a:rPr lang="en-US" dirty="0"/>
-              <a:t>”</a:t>
-            </a:r>
-          </a:p>
-        </p:txBody>
-      </p:sp>
-      <p:pic>
-        <p:nvPicPr>
-          <p:cNvPr id="3" name="Picture 2"/>
-          <p:cNvPicPr>
-            <a:picLocks noChangeAspect="1"/>
-          </p:cNvPicPr>
-          <p:nvPr/>
-        </p:nvPicPr>
-        <p:blipFill>
-          <a:blip r:embed="rId2"/>
-          <a:stretch>
-            <a:fillRect/>
-          </a:stretch>
-        </p:blipFill>
-        <p:spPr>
-          <a:xfrm>
-            <a:off x="3580534" y="1671271"/>
-            <a:ext cx="4641373" cy="5170975"/>
-          </a:xfrm>
-          <a:prstGeom prst="rect">
-            <a:avLst/>
-          </a:prstGeom>
-        </p:spPr>
-      </p:pic>
-    </p:spTree>
-    <p:extLst>
-      <p:ext uri="{BB962C8B-B14F-4D97-AF65-F5344CB8AC3E}">
-        <p14:creationId xmlns:p14="http://schemas.microsoft.com/office/powerpoint/2010/main" val="1254053615"/>
-      </p:ext>
-    </p:extLst>
-  </p:cSld>
-  <p:clrMapOvr>
-    <a:masterClrMapping/>
-  </p:clrMapOvr>
-</p:sld>
-</file>
-
-<file path=ppt/slides/slide11.xml><?xml version="1.0" encoding="utf-8"?>
 <p:sld xmlns:a="http://schemas.openxmlformats.org/drawingml/2006/main" xmlns:r="http://schemas.openxmlformats.org/officeDocument/2006/relationships" xmlns:p="http://schemas.openxmlformats.org/presentationml/2006/main">
   <p:cSld>
     <p:spTree>
@@ -3713,7 +3606,7 @@
 </p:sld>
 </file>
 
-<file path=ppt/slides/slide12.xml><?xml version="1.0" encoding="utf-8"?>
+<file path=ppt/slides/slide11.xml><?xml version="1.0" encoding="utf-8"?>
 <p:sld xmlns:a="http://schemas.openxmlformats.org/drawingml/2006/main" xmlns:r="http://schemas.openxmlformats.org/officeDocument/2006/relationships" xmlns:p="http://schemas.openxmlformats.org/presentationml/2006/main">
   <p:cSld>
     <p:spTree>
@@ -3815,7 +3708,7 @@
 </p:sld>
 </file>
 
-<file path=ppt/slides/slide13.xml><?xml version="1.0" encoding="utf-8"?>
+<file path=ppt/slides/slide12.xml><?xml version="1.0" encoding="utf-8"?>
 <p:sld xmlns:a="http://schemas.openxmlformats.org/drawingml/2006/main" xmlns:r="http://schemas.openxmlformats.org/officeDocument/2006/relationships" xmlns:p="http://schemas.openxmlformats.org/presentationml/2006/main">
   <p:cSld>
     <p:spTree>
@@ -4066,7 +3959,7 @@
 </p:sld>
 </file>
 
-<file path=ppt/slides/slide14.xml><?xml version="1.0" encoding="utf-8"?>
+<file path=ppt/slides/slide13.xml><?xml version="1.0" encoding="utf-8"?>
 <p:sld xmlns:a="http://schemas.openxmlformats.org/drawingml/2006/main" xmlns:r="http://schemas.openxmlformats.org/officeDocument/2006/relationships" xmlns:p="http://schemas.openxmlformats.org/presentationml/2006/main">
   <p:cSld>
     <p:spTree>
@@ -4100,7 +3993,7 @@
           <a:p>
             <a:r>
               <a:rPr lang="en-US" dirty="0"/>
-              <a:t>Almost forgot – pdf requires </a:t>
+              <a:t>It is required – pdf requires </a:t>
             </a:r>
             <a:r>
               <a:rPr lang="en-US" dirty="0" err="1"/>
@@ -4134,6 +4027,52 @@
           </a:prstGeom>
         </p:spPr>
       </p:pic>
+      <p:sp>
+        <p:nvSpPr>
+          <p:cNvPr id="4" name="Rectangle 3"/>
+          <p:cNvSpPr/>
+          <p:nvPr/>
+        </p:nvSpPr>
+        <p:spPr>
+          <a:xfrm>
+            <a:off x="5100810" y="4208443"/>
+            <a:ext cx="3448279" cy="661012"/>
+          </a:xfrm>
+          <a:prstGeom prst="rect">
+            <a:avLst/>
+          </a:prstGeom>
+          <a:noFill/>
+          <a:ln w="38100">
+            <a:solidFill>
+              <a:srgbClr val="FF0000"/>
+            </a:solidFill>
+          </a:ln>
+        </p:spPr>
+        <p:style>
+          <a:lnRef idx="2">
+            <a:schemeClr val="accent1">
+              <a:shade val="50000"/>
+            </a:schemeClr>
+          </a:lnRef>
+          <a:fillRef idx="1">
+            <a:schemeClr val="accent1"/>
+          </a:fillRef>
+          <a:effectRef idx="0">
+            <a:schemeClr val="accent1"/>
+          </a:effectRef>
+          <a:fontRef idx="minor">
+            <a:schemeClr val="lt1"/>
+          </a:fontRef>
+        </p:style>
+        <p:txBody>
+          <a:bodyPr rtlCol="0" anchor="ctr"/>
+          <a:lstStyle/>
+          <a:p>
+            <a:pPr algn="ctr"/>
+            <a:endParaRPr lang="en-US"/>
+          </a:p>
+        </p:txBody>
+      </p:sp>
     </p:spTree>
     <p:extLst>
       <p:ext uri="{BB962C8B-B14F-4D97-AF65-F5344CB8AC3E}">
@@ -4144,6 +4083,138 @@
   <p:clrMapOvr>
     <a:masterClrMapping/>
   </p:clrMapOvr>
+  <p:timing>
+    <p:tnLst>
+      <p:par>
+        <p:cTn id="1" dur="indefinite" restart="never" nodeType="tmRoot">
+          <p:childTnLst>
+            <p:seq concurrent="1" nextAc="seek">
+              <p:cTn id="2" dur="indefinite" nodeType="mainSeq">
+                <p:childTnLst>
+                  <p:par>
+                    <p:cTn id="3" fill="hold">
+                      <p:stCondLst>
+                        <p:cond delay="indefinite"/>
+                      </p:stCondLst>
+                      <p:childTnLst>
+                        <p:par>
+                          <p:cTn id="4" fill="hold">
+                            <p:stCondLst>
+                              <p:cond delay="0"/>
+                            </p:stCondLst>
+                            <p:childTnLst>
+                              <p:par>
+                                <p:cTn id="5" presetID="53" presetClass="entr" presetSubtype="16" fill="hold" grpId="0" nodeType="clickEffect">
+                                  <p:stCondLst>
+                                    <p:cond delay="0"/>
+                                  </p:stCondLst>
+                                  <p:childTnLst>
+                                    <p:set>
+                                      <p:cBhvr>
+                                        <p:cTn id="6" dur="1" fill="hold">
+                                          <p:stCondLst>
+                                            <p:cond delay="0"/>
+                                          </p:stCondLst>
+                                        </p:cTn>
+                                        <p:tgtEl>
+                                          <p:spTgt spid="4"/>
+                                        </p:tgtEl>
+                                        <p:attrNameLst>
+                                          <p:attrName>style.visibility</p:attrName>
+                                        </p:attrNameLst>
+                                      </p:cBhvr>
+                                      <p:to>
+                                        <p:strVal val="visible"/>
+                                      </p:to>
+                                    </p:set>
+                                    <p:anim calcmode="lin" valueType="num">
+                                      <p:cBhvr>
+                                        <p:cTn id="7" dur="500" fill="hold"/>
+                                        <p:tgtEl>
+                                          <p:spTgt spid="4"/>
+                                        </p:tgtEl>
+                                        <p:attrNameLst>
+                                          <p:attrName>ppt_w</p:attrName>
+                                        </p:attrNameLst>
+                                      </p:cBhvr>
+                                      <p:tavLst>
+                                        <p:tav tm="0">
+                                          <p:val>
+                                            <p:fltVal val="0"/>
+                                          </p:val>
+                                        </p:tav>
+                                        <p:tav tm="100000">
+                                          <p:val>
+                                            <p:strVal val="#ppt_w"/>
+                                          </p:val>
+                                        </p:tav>
+                                      </p:tavLst>
+                                    </p:anim>
+                                    <p:anim calcmode="lin" valueType="num">
+                                      <p:cBhvr>
+                                        <p:cTn id="8" dur="500" fill="hold"/>
+                                        <p:tgtEl>
+                                          <p:spTgt spid="4"/>
+                                        </p:tgtEl>
+                                        <p:attrNameLst>
+                                          <p:attrName>ppt_h</p:attrName>
+                                        </p:attrNameLst>
+                                      </p:cBhvr>
+                                      <p:tavLst>
+                                        <p:tav tm="0">
+                                          <p:val>
+                                            <p:fltVal val="0"/>
+                                          </p:val>
+                                        </p:tav>
+                                        <p:tav tm="100000">
+                                          <p:val>
+                                            <p:strVal val="#ppt_h"/>
+                                          </p:val>
+                                        </p:tav>
+                                      </p:tavLst>
+                                    </p:anim>
+                                    <p:animEffect transition="in" filter="fade">
+                                      <p:cBhvr>
+                                        <p:cTn id="9" dur="500"/>
+                                        <p:tgtEl>
+                                          <p:spTgt spid="4"/>
+                                        </p:tgtEl>
+                                      </p:cBhvr>
+                                    </p:animEffect>
+                                  </p:childTnLst>
+                                </p:cTn>
+                              </p:par>
+                            </p:childTnLst>
+                          </p:cTn>
+                        </p:par>
+                      </p:childTnLst>
+                    </p:cTn>
+                  </p:par>
+                </p:childTnLst>
+              </p:cTn>
+              <p:prevCondLst>
+                <p:cond evt="onPrev" delay="0">
+                  <p:tgtEl>
+                    <p:sldTgt/>
+                  </p:tgtEl>
+                </p:cond>
+              </p:prevCondLst>
+              <p:nextCondLst>
+                <p:cond evt="onNext" delay="0">
+                  <p:tgtEl>
+                    <p:sldTgt/>
+                  </p:tgtEl>
+                </p:cond>
+              </p:nextCondLst>
+            </p:seq>
+          </p:childTnLst>
+        </p:cTn>
+      </p:par>
+    </p:tnLst>
+    <p:bldLst>
+      <p:bldP spid="4" grpId="0" animBg="1"/>
+    </p:bldLst>
+  </p:timing>
 </p:sld>
 </file>
 
@@ -5866,91 +5937,109 @@
       </p:grpSpPr>
       <p:sp>
         <p:nvSpPr>
-          <p:cNvPr id="2" name="TextBox 1"/>
-          <p:cNvSpPr txBox="1"/>
-          <p:nvPr/>
-        </p:nvSpPr>
-        <p:spPr>
-          <a:xfrm>
-            <a:off x="3200401" y="2819401"/>
-            <a:ext cx="5524589" cy="1477328"/>
-          </a:xfrm>
-          <a:prstGeom prst="rect">
-            <a:avLst/>
-          </a:prstGeom>
-          <a:noFill/>
-        </p:spPr>
-        <p:txBody>
-          <a:bodyPr wrap="none" rtlCol="0">
-            <a:spAutoFit/>
+          <p:cNvPr id="2" name="Title 1"/>
+          <p:cNvSpPr>
+            <a:spLocks noGrp="1"/>
+          </p:cNvSpPr>
+          <p:nvPr>
+            <p:ph type="title"/>
+          </p:nvPr>
+        </p:nvSpPr>
+        <p:spPr/>
+        <p:txBody>
+          <a:bodyPr/>
+          <a:lstStyle/>
+          <a:p>
+            <a:r>
+              <a:rPr lang="en-US" dirty="0"/>
+              <a:t>Produce a pdf report -- suggested prerequisite </a:t>
+            </a:r>
+          </a:p>
+        </p:txBody>
+      </p:sp>
+      <p:sp>
+        <p:nvSpPr>
+          <p:cNvPr id="3" name="Content Placeholder 2"/>
+          <p:cNvSpPr>
+            <a:spLocks noGrp="1"/>
+          </p:cNvSpPr>
+          <p:nvPr>
+            <p:ph idx="1"/>
+          </p:nvPr>
+        </p:nvSpPr>
+        <p:spPr/>
+        <p:txBody>
+          <a:bodyPr>
+            <a:normAutofit/>
           </a:bodyPr>
           <a:lstStyle/>
           <a:p>
             <a:r>
-              <a:rPr lang="en-US" dirty="0"/>
-              <a:t>Demo on “titanic” </a:t>
-            </a:r>
-            <a:r>
-              <a:rPr lang="en-US" dirty="0" err="1"/>
-              <a:t>randomforest</a:t>
-            </a:r>
-            <a:r>
-              <a:rPr lang="en-US" dirty="0"/>
-              <a:t> prediction if time allows</a:t>
-            </a:r>
-          </a:p>
-          <a:p>
-            <a:r>
-              <a:rPr lang="en-US" dirty="0"/>
-              <a:t>Need .</a:t>
-            </a:r>
-            <a:r>
-              <a:rPr lang="en-US" dirty="0" err="1"/>
-              <a:t>rmd</a:t>
-            </a:r>
-            <a:r>
-              <a:rPr lang="en-US" dirty="0"/>
-              <a:t> code demo</a:t>
-            </a:r>
-          </a:p>
-          <a:p>
-            <a:r>
-              <a:rPr lang="en-US" dirty="0"/>
-              <a:t>Need to render .</a:t>
-            </a:r>
-            <a:r>
-              <a:rPr lang="en-US" dirty="0" err="1"/>
-              <a:t>rmd</a:t>
-            </a:r>
-            <a:endParaRPr lang="en-US" dirty="0"/>
-          </a:p>
-          <a:p>
-            <a:r>
-              <a:rPr lang="en-US" dirty="0"/>
-              <a:t>Need to launch html report</a:t>
-            </a:r>
-          </a:p>
-          <a:p>
-            <a:r>
-              <a:rPr lang="en-US" dirty="0"/>
-              <a:t>Demo-</a:t>
-            </a:r>
-            <a:r>
-              <a:rPr lang="en-US" dirty="0" err="1"/>
-              <a:t>goldengate</a:t>
-            </a:r>
-            <a:r>
-              <a:rPr lang="en-US"/>
-              <a:t> project</a:t>
-            </a:r>
-            <a:endParaRPr lang="en-US" dirty="0"/>
+              <a:rPr lang="en-US" sz="2600" dirty="0"/>
+              <a:t>http://rmarkdown.rstudio.com/pdf_document_format.html#overview</a:t>
+            </a:r>
+          </a:p>
+          <a:p>
+            <a:r>
+              <a:rPr lang="en-US" sz="2600" dirty="0"/>
+              <a:t>Within </a:t>
+            </a:r>
+            <a:r>
+              <a:rPr lang="en-US" sz="2600" dirty="0" err="1"/>
+              <a:t>Rstudio</a:t>
+            </a:r>
+            <a:r>
+              <a:rPr lang="en-US" sz="2600" dirty="0"/>
+              <a:t> (assuming </a:t>
+            </a:r>
+            <a:r>
+              <a:rPr lang="en-US" sz="2600" dirty="0" err="1"/>
+              <a:t>Rstudio</a:t>
+            </a:r>
+            <a:r>
+              <a:rPr lang="en-US" sz="2600" dirty="0"/>
+              <a:t> is installed)</a:t>
+            </a:r>
+          </a:p>
+          <a:p>
+            <a:r>
+              <a:rPr lang="en-US" sz="2600" dirty="0"/>
+              <a:t>There is an R package called “</a:t>
+            </a:r>
+            <a:r>
+              <a:rPr lang="en-US" sz="2600" dirty="0" err="1"/>
+              <a:t>rticles</a:t>
+            </a:r>
+            <a:r>
+              <a:rPr lang="en-US" sz="2600" dirty="0"/>
+              <a:t>”</a:t>
+            </a:r>
+          </a:p>
+          <a:p>
+            <a:pPr lvl="1"/>
+            <a:r>
+              <a:rPr lang="en-US" sz="2600" dirty="0"/>
+              <a:t>https://github.com/rstudio/rticles</a:t>
+            </a:r>
+          </a:p>
+          <a:p>
+            <a:r>
+              <a:rPr lang="en-US" sz="2600" dirty="0"/>
+              <a:t>Just following the tutorial session</a:t>
+            </a:r>
+          </a:p>
+          <a:p>
+            <a:r>
+              <a:rPr lang="en-US" sz="2600" dirty="0"/>
+              <a:t>Produce a Journal of Statistical Software</a:t>
+            </a:r>
           </a:p>
         </p:txBody>
       </p:sp>
     </p:spTree>
     <p:extLst>
       <p:ext uri="{BB962C8B-B14F-4D97-AF65-F5344CB8AC3E}">
-        <p14:creationId xmlns:p14="http://schemas.microsoft.com/office/powerpoint/2010/main" val="2881104536"/>
+        <p14:creationId xmlns:p14="http://schemas.microsoft.com/office/powerpoint/2010/main" val="1513036706"/>
       </p:ext>
     </p:extLst>
   </p:cSld>
@@ -5994,94 +6083,63 @@
           <a:p>
             <a:r>
               <a:rPr lang="en-US" dirty="0"/>
-              <a:t>Produce a pdf report -- suggested prerequisite </a:t>
-            </a:r>
-          </a:p>
-        </p:txBody>
-      </p:sp>
-      <p:sp>
-        <p:nvSpPr>
-          <p:cNvPr id="3" name="Content Placeholder 2"/>
-          <p:cNvSpPr>
-            <a:spLocks noGrp="1"/>
-          </p:cNvSpPr>
-          <p:nvPr>
-            <p:ph idx="1"/>
-          </p:nvPr>
-        </p:nvSpPr>
-        <p:spPr/>
-        <p:txBody>
-          <a:bodyPr>
-            <a:normAutofit/>
-          </a:bodyPr>
-          <a:lstStyle/>
-          <a:p>
-            <a:r>
-              <a:rPr lang="en-US" sz="2600" dirty="0"/>
-              <a:t>http://rmarkdown.rstudio.com/pdf_document_format.html#overview</a:t>
-            </a:r>
-          </a:p>
-          <a:p>
-            <a:r>
-              <a:rPr lang="en-US" sz="2600" dirty="0"/>
-              <a:t>Within </a:t>
-            </a:r>
-            <a:r>
-              <a:rPr lang="en-US" sz="2600" dirty="0" err="1"/>
-              <a:t>Rstudio</a:t>
-            </a:r>
-            <a:r>
-              <a:rPr lang="en-US" sz="2600" dirty="0"/>
-              <a:t> (assuming </a:t>
-            </a:r>
-            <a:r>
-              <a:rPr lang="en-US" sz="2600" dirty="0" err="1"/>
-              <a:t>Rstudio</a:t>
-            </a:r>
-            <a:r>
-              <a:rPr lang="en-US" sz="2600" dirty="0"/>
-              <a:t> is installed)</a:t>
-            </a:r>
-          </a:p>
-          <a:p>
-            <a:r>
-              <a:rPr lang="en-US" sz="2600" dirty="0"/>
-              <a:t>There is an R package called “</a:t>
-            </a:r>
-            <a:r>
-              <a:rPr lang="en-US" sz="2600" dirty="0" err="1"/>
+              <a:t>“</a:t>
+            </a:r>
+            <a:r>
+              <a:rPr lang="en-US" dirty="0" err="1"/>
               <a:t>rticles</a:t>
             </a:r>
             <a:r>
-              <a:rPr lang="en-US" sz="2600" dirty="0"/>
+              <a:rPr lang="en-US" dirty="0"/>
+              <a:t>” installation – create first “</a:t>
+            </a:r>
+            <a:r>
+              <a:rPr lang="en-US" dirty="0" err="1"/>
+              <a:t>rticles</a:t>
+            </a:r>
+            <a:r>
+              <a:rPr lang="en-US" dirty="0"/>
+              <a:t> - </a:t>
+            </a:r>
+            <a:r>
+              <a:rPr lang="en-US" dirty="0" err="1"/>
+              <a:t>jss</a:t>
+            </a:r>
+            <a:r>
+              <a:rPr lang="en-US" dirty="0"/>
               <a:t>”</a:t>
             </a:r>
           </a:p>
-          <a:p>
-            <a:pPr lvl="1"/>
-            <a:r>
-              <a:rPr lang="en-US" sz="2600" dirty="0"/>
-              <a:t>https://github.com/rstudio/rticles</a:t>
-            </a:r>
-          </a:p>
-          <a:p>
-            <a:r>
-              <a:rPr lang="en-US" sz="2600" dirty="0"/>
-              <a:t>Just following the tutorial session</a:t>
-            </a:r>
-          </a:p>
-          <a:p>
-            <a:r>
-              <a:rPr lang="en-US" sz="2600" dirty="0"/>
-              <a:t>Produce a Journal of Statistical Software</a:t>
-            </a:r>
-          </a:p>
-        </p:txBody>
-      </p:sp>
+        </p:txBody>
+      </p:sp>
+      <p:pic>
+        <p:nvPicPr>
+          <p:cNvPr id="3" name="Picture 2"/>
+          <p:cNvPicPr>
+            <a:picLocks noChangeAspect="1"/>
+          </p:cNvPicPr>
+          <p:nvPr/>
+        </p:nvPicPr>
+        <p:blipFill>
+          <a:blip r:embed="rId2"/>
+          <a:stretch>
+            <a:fillRect/>
+          </a:stretch>
+        </p:blipFill>
+        <p:spPr>
+          <a:xfrm>
+            <a:off x="3580534" y="1671271"/>
+            <a:ext cx="4641373" cy="5170975"/>
+          </a:xfrm>
+          <a:prstGeom prst="rect">
+            <a:avLst/>
+          </a:prstGeom>
+        </p:spPr>
+      </p:pic>
     </p:spTree>
     <p:extLst>
       <p:ext uri="{BB962C8B-B14F-4D97-AF65-F5344CB8AC3E}">
-        <p14:creationId xmlns:p14="http://schemas.microsoft.com/office/powerpoint/2010/main" val="1513036706"/>
+        <p14:creationId xmlns:p14="http://schemas.microsoft.com/office/powerpoint/2010/main" val="1254053615"/>
       </p:ext>
     </p:extLst>
   </p:cSld>

</xml_diff>

<commit_message>
changes for R topic
</commit_message>
<xml_diff>
--- a/IB_group_meeting/R_special_features.pptx
+++ b/IB_group_meeting/R_special_features.pptx
@@ -5,7 +5,7 @@
     <p:sldMasterId id="2147483648" r:id="rId1"/>
   </p:sldMasterIdLst>
   <p:notesMasterIdLst>
-    <p:notesMasterId r:id="rId15"/>
+    <p:notesMasterId r:id="rId18"/>
   </p:notesMasterIdLst>
   <p:sldIdLst>
     <p:sldId id="256" r:id="rId2"/>
@@ -21,6 +21,9 @@
     <p:sldId id="268" r:id="rId12"/>
     <p:sldId id="269" r:id="rId13"/>
     <p:sldId id="270" r:id="rId14"/>
+    <p:sldId id="273" r:id="rId15"/>
+    <p:sldId id="271" r:id="rId16"/>
+    <p:sldId id="272" r:id="rId17"/>
   </p:sldIdLst>
   <p:sldSz cx="12192000" cy="6858000"/>
   <p:notesSz cx="6858000" cy="9144000"/>
@@ -209,7 +212,7 @@
           <a:p>
             <a:fld id="{FBA93876-7EAB-4D06-A256-484099890229}" type="datetimeFigureOut">
               <a:rPr lang="en-US" smtClean="0"/>
-              <a:t>10/17/2017</a:t>
+              <a:t>10/17/17</a:t>
             </a:fld>
             <a:endParaRPr lang="en-US"/>
           </a:p>
@@ -576,6 +579,96 @@
 </p:notes>
 </file>
 
+<file path=ppt/notesSlides/notesSlide2.xml><?xml version="1.0" encoding="utf-8"?>
+<p:notes xmlns:a="http://schemas.openxmlformats.org/drawingml/2006/main" xmlns:r="http://schemas.openxmlformats.org/officeDocument/2006/relationships" xmlns:p="http://schemas.openxmlformats.org/presentationml/2006/main">
+  <p:cSld>
+    <p:spTree>
+      <p:nvGrpSpPr>
+        <p:cNvPr id="1" name=""/>
+        <p:cNvGrpSpPr/>
+        <p:nvPr/>
+      </p:nvGrpSpPr>
+      <p:grpSpPr>
+        <a:xfrm>
+          <a:off x="0" y="0"/>
+          <a:ext cx="0" cy="0"/>
+          <a:chOff x="0" y="0"/>
+          <a:chExt cx="0" cy="0"/>
+        </a:xfrm>
+      </p:grpSpPr>
+      <p:sp>
+        <p:nvSpPr>
+          <p:cNvPr id="2" name="Slide Image Placeholder 1"/>
+          <p:cNvSpPr>
+            <a:spLocks noGrp="1" noRot="1" noChangeAspect="1"/>
+          </p:cNvSpPr>
+          <p:nvPr>
+            <p:ph type="sldImg"/>
+          </p:nvPr>
+        </p:nvSpPr>
+        <p:spPr/>
+      </p:sp>
+      <p:sp>
+        <p:nvSpPr>
+          <p:cNvPr id="3" name="Notes Placeholder 2"/>
+          <p:cNvSpPr>
+            <a:spLocks noGrp="1"/>
+          </p:cNvSpPr>
+          <p:nvPr>
+            <p:ph type="body" idx="1"/>
+          </p:nvPr>
+        </p:nvSpPr>
+        <p:spPr/>
+        <p:txBody>
+          <a:bodyPr/>
+          <a:lstStyle/>
+          <a:p>
+            <a:r>
+              <a:rPr lang="en-US" dirty="0" smtClean="0"/>
+              <a:t>Switch to demo</a:t>
+            </a:r>
+          </a:p>
+          <a:p>
+            <a:endParaRPr lang="en-US" dirty="0"/>
+          </a:p>
+        </p:txBody>
+      </p:sp>
+      <p:sp>
+        <p:nvSpPr>
+          <p:cNvPr id="4" name="Slide Number Placeholder 3"/>
+          <p:cNvSpPr>
+            <a:spLocks noGrp="1"/>
+          </p:cNvSpPr>
+          <p:nvPr>
+            <p:ph type="sldNum" sz="quarter" idx="10"/>
+          </p:nvPr>
+        </p:nvSpPr>
+        <p:spPr/>
+        <p:txBody>
+          <a:bodyPr/>
+          <a:lstStyle/>
+          <a:p>
+            <a:fld id="{5B912F5D-EA38-4FB7-A8E1-35E914710ACC}" type="slidenum">
+              <a:rPr lang="en-US" smtClean="0"/>
+              <a:t>15</a:t>
+            </a:fld>
+            <a:endParaRPr lang="en-US"/>
+          </a:p>
+        </p:txBody>
+      </p:sp>
+    </p:spTree>
+    <p:extLst>
+      <p:ext uri="{BB962C8B-B14F-4D97-AF65-F5344CB8AC3E}">
+        <p14:creationId xmlns:p14="http://schemas.microsoft.com/office/powerpoint/2010/main" val="1326092434"/>
+      </p:ext>
+    </p:extLst>
+  </p:cSld>
+  <p:clrMapOvr>
+    <a:masterClrMapping/>
+  </p:clrMapOvr>
+</p:notes>
+</file>
+
 <file path=ppt/slideLayouts/slideLayout1.xml><?xml version="1.0" encoding="utf-8"?>
 <p:sldLayout xmlns:a="http://schemas.openxmlformats.org/drawingml/2006/main" xmlns:r="http://schemas.openxmlformats.org/officeDocument/2006/relationships" xmlns:p="http://schemas.openxmlformats.org/presentationml/2006/main" type="title" preserve="1">
   <p:cSld name="Title Slide">
@@ -705,7 +798,7 @@
           <a:p>
             <a:fld id="{18A3E1E4-0E0E-466C-9725-0FB18B8C2F46}" type="datetimeFigureOut">
               <a:rPr lang="en-US" smtClean="0"/>
-              <a:t>10/17/2017</a:t>
+              <a:t>10/17/17</a:t>
             </a:fld>
             <a:endParaRPr lang="en-US"/>
           </a:p>
@@ -873,7 +966,7 @@
           <a:p>
             <a:fld id="{18A3E1E4-0E0E-466C-9725-0FB18B8C2F46}" type="datetimeFigureOut">
               <a:rPr lang="en-US" smtClean="0"/>
-              <a:t>10/17/2017</a:t>
+              <a:t>10/17/17</a:t>
             </a:fld>
             <a:endParaRPr lang="en-US"/>
           </a:p>
@@ -1051,7 +1144,7 @@
           <a:p>
             <a:fld id="{18A3E1E4-0E0E-466C-9725-0FB18B8C2F46}" type="datetimeFigureOut">
               <a:rPr lang="en-US" smtClean="0"/>
-              <a:t>10/17/2017</a:t>
+              <a:t>10/17/17</a:t>
             </a:fld>
             <a:endParaRPr lang="en-US"/>
           </a:p>
@@ -1219,7 +1312,7 @@
           <a:p>
             <a:fld id="{18A3E1E4-0E0E-466C-9725-0FB18B8C2F46}" type="datetimeFigureOut">
               <a:rPr lang="en-US" smtClean="0"/>
-              <a:t>10/17/2017</a:t>
+              <a:t>10/17/17</a:t>
             </a:fld>
             <a:endParaRPr lang="en-US"/>
           </a:p>
@@ -1464,7 +1557,7 @@
           <a:p>
             <a:fld id="{18A3E1E4-0E0E-466C-9725-0FB18B8C2F46}" type="datetimeFigureOut">
               <a:rPr lang="en-US" smtClean="0"/>
-              <a:t>10/17/2017</a:t>
+              <a:t>10/17/17</a:t>
             </a:fld>
             <a:endParaRPr lang="en-US"/>
           </a:p>
@@ -1693,7 +1786,7 @@
           <a:p>
             <a:fld id="{18A3E1E4-0E0E-466C-9725-0FB18B8C2F46}" type="datetimeFigureOut">
               <a:rPr lang="en-US" smtClean="0"/>
-              <a:t>10/17/2017</a:t>
+              <a:t>10/17/17</a:t>
             </a:fld>
             <a:endParaRPr lang="en-US"/>
           </a:p>
@@ -2057,7 +2150,7 @@
           <a:p>
             <a:fld id="{18A3E1E4-0E0E-466C-9725-0FB18B8C2F46}" type="datetimeFigureOut">
               <a:rPr lang="en-US" smtClean="0"/>
-              <a:t>10/17/2017</a:t>
+              <a:t>10/17/17</a:t>
             </a:fld>
             <a:endParaRPr lang="en-US"/>
           </a:p>
@@ -2174,7 +2267,7 @@
           <a:p>
             <a:fld id="{18A3E1E4-0E0E-466C-9725-0FB18B8C2F46}" type="datetimeFigureOut">
               <a:rPr lang="en-US" smtClean="0"/>
-              <a:t>10/17/2017</a:t>
+              <a:t>10/17/17</a:t>
             </a:fld>
             <a:endParaRPr lang="en-US"/>
           </a:p>
@@ -2269,7 +2362,7 @@
           <a:p>
             <a:fld id="{18A3E1E4-0E0E-466C-9725-0FB18B8C2F46}" type="datetimeFigureOut">
               <a:rPr lang="en-US" smtClean="0"/>
-              <a:t>10/17/2017</a:t>
+              <a:t>10/17/17</a:t>
             </a:fld>
             <a:endParaRPr lang="en-US"/>
           </a:p>
@@ -2544,7 +2637,7 @@
           <a:p>
             <a:fld id="{18A3E1E4-0E0E-466C-9725-0FB18B8C2F46}" type="datetimeFigureOut">
               <a:rPr lang="en-US" smtClean="0"/>
-              <a:t>10/17/2017</a:t>
+              <a:t>10/17/17</a:t>
             </a:fld>
             <a:endParaRPr lang="en-US"/>
           </a:p>
@@ -2796,7 +2889,7 @@
           <a:p>
             <a:fld id="{18A3E1E4-0E0E-466C-9725-0FB18B8C2F46}" type="datetimeFigureOut">
               <a:rPr lang="en-US" smtClean="0"/>
-              <a:t>10/17/2017</a:t>
+              <a:t>10/17/17</a:t>
             </a:fld>
             <a:endParaRPr lang="en-US"/>
           </a:p>
@@ -3007,7 +3100,7 @@
           <a:p>
             <a:fld id="{18A3E1E4-0E0E-466C-9725-0FB18B8C2F46}" type="datetimeFigureOut">
               <a:rPr lang="en-US" smtClean="0"/>
-              <a:t>10/17/2017</a:t>
+              <a:t>10/17/17</a:t>
             </a:fld>
             <a:endParaRPr lang="en-US"/>
           </a:p>
@@ -3461,7 +3554,19 @@
             </a:r>
             <a:r>
               <a:rPr lang="en-US" dirty="0"/>
-              <a:t>, R-parallel, etc.</a:t>
+              <a:t>, </a:t>
+            </a:r>
+            <a:r>
+              <a:rPr lang="en-US" dirty="0" smtClean="0"/>
+              <a:t>speed up with </a:t>
+            </a:r>
+            <a:r>
+              <a:rPr lang="en-US" dirty="0" smtClean="0"/>
+              <a:t>R-parallel</a:t>
+            </a:r>
+            <a:r>
+              <a:rPr lang="en-US" dirty="0"/>
+              <a:t>, etc.</a:t>
             </a:r>
           </a:p>
         </p:txBody>
@@ -4215,6 +4320,335 @@
       <p:bldP spid="4" grpId="0" animBg="1"/>
     </p:bldLst>
   </p:timing>
+</p:sld>
+</file>
+
+<file path=ppt/slides/slide14.xml><?xml version="1.0" encoding="utf-8"?>
+<p:sld xmlns:a="http://schemas.openxmlformats.org/drawingml/2006/main" xmlns:r="http://schemas.openxmlformats.org/officeDocument/2006/relationships" xmlns:p="http://schemas.openxmlformats.org/presentationml/2006/main">
+  <p:cSld>
+    <p:spTree>
+      <p:nvGrpSpPr>
+        <p:cNvPr id="1" name=""/>
+        <p:cNvGrpSpPr/>
+        <p:nvPr/>
+      </p:nvGrpSpPr>
+      <p:grpSpPr>
+        <a:xfrm>
+          <a:off x="0" y="0"/>
+          <a:ext cx="0" cy="0"/>
+          <a:chOff x="0" y="0"/>
+          <a:chExt cx="0" cy="0"/>
+        </a:xfrm>
+      </p:grpSpPr>
+      <p:sp>
+        <p:nvSpPr>
+          <p:cNvPr id="2" name="Title 1"/>
+          <p:cNvSpPr>
+            <a:spLocks noGrp="1"/>
+          </p:cNvSpPr>
+          <p:nvPr>
+            <p:ph type="title"/>
+          </p:nvPr>
+        </p:nvSpPr>
+        <p:spPr/>
+        <p:txBody>
+          <a:bodyPr/>
+          <a:lstStyle/>
+          <a:p>
+            <a:r>
+              <a:rPr lang="en-US" dirty="0" smtClean="0"/>
+              <a:t>R </a:t>
+            </a:r>
+            <a:r>
+              <a:rPr lang="mr-IN" dirty="0" smtClean="0"/>
+              <a:t>–</a:t>
+            </a:r>
+            <a:r>
+              <a:rPr lang="en-US" dirty="0" smtClean="0"/>
+              <a:t> parallel processing</a:t>
+            </a:r>
+            <a:endParaRPr lang="en-US" dirty="0"/>
+          </a:p>
+        </p:txBody>
+      </p:sp>
+      <p:sp>
+        <p:nvSpPr>
+          <p:cNvPr id="3" name="Content Placeholder 2"/>
+          <p:cNvSpPr>
+            <a:spLocks noGrp="1"/>
+          </p:cNvSpPr>
+          <p:nvPr>
+            <p:ph idx="1"/>
+          </p:nvPr>
+        </p:nvSpPr>
+        <p:spPr/>
+        <p:txBody>
+          <a:bodyPr/>
+          <a:lstStyle/>
+          <a:p>
+            <a:r>
+              <a:rPr lang="en-US" dirty="0" smtClean="0"/>
+              <a:t>”for” loop in R is quite inefficient</a:t>
+            </a:r>
+          </a:p>
+          <a:p>
+            <a:r>
+              <a:rPr lang="en-US" dirty="0" smtClean="0"/>
+              <a:t>Use “apply” and its derivatives if possible</a:t>
+            </a:r>
+          </a:p>
+          <a:p>
+            <a:r>
+              <a:rPr lang="en-US" dirty="0" smtClean="0"/>
+              <a:t>“</a:t>
+            </a:r>
+            <a:r>
+              <a:rPr lang="en-US" dirty="0" err="1" smtClean="0"/>
+              <a:t>foreach</a:t>
+            </a:r>
+            <a:r>
+              <a:rPr lang="en-US" dirty="0" smtClean="0"/>
+              <a:t>” pairs with “</a:t>
+            </a:r>
+            <a:r>
+              <a:rPr lang="en-US" dirty="0" err="1" smtClean="0"/>
+              <a:t>dopar</a:t>
+            </a:r>
+            <a:r>
+              <a:rPr lang="en-US" dirty="0" smtClean="0"/>
+              <a:t>” speeds up the process</a:t>
+            </a:r>
+          </a:p>
+          <a:p>
+            <a:r>
+              <a:rPr lang="en-US" dirty="0" smtClean="0"/>
+              <a:t>Two R packages support “</a:t>
+            </a:r>
+            <a:r>
+              <a:rPr lang="en-US" dirty="0" err="1" smtClean="0"/>
+              <a:t>dopar</a:t>
+            </a:r>
+            <a:r>
+              <a:rPr lang="en-US" dirty="0" smtClean="0"/>
+              <a:t>”</a:t>
+            </a:r>
+          </a:p>
+          <a:p>
+            <a:pPr lvl="1"/>
+            <a:r>
+              <a:rPr lang="en-US" dirty="0" err="1" smtClean="0"/>
+              <a:t>doParallel</a:t>
+            </a:r>
+            <a:endParaRPr lang="en-US" dirty="0"/>
+          </a:p>
+          <a:p>
+            <a:pPr lvl="1"/>
+            <a:r>
+              <a:rPr lang="en-US" smtClean="0"/>
+              <a:t>doMC</a:t>
+            </a:r>
+            <a:endParaRPr lang="en-US" dirty="0" smtClean="0"/>
+          </a:p>
+          <a:p>
+            <a:r>
+              <a:rPr lang="en-US" dirty="0" smtClean="0"/>
+              <a:t>”</a:t>
+            </a:r>
+            <a:r>
+              <a:rPr lang="en-US" dirty="0" err="1" smtClean="0"/>
+              <a:t>dopar</a:t>
+            </a:r>
+            <a:r>
+              <a:rPr lang="en-US" dirty="0" smtClean="0"/>
+              <a:t>” does have overhead</a:t>
+            </a:r>
+            <a:endParaRPr lang="en-US" dirty="0"/>
+          </a:p>
+        </p:txBody>
+      </p:sp>
+    </p:spTree>
+    <p:extLst>
+      <p:ext uri="{BB962C8B-B14F-4D97-AF65-F5344CB8AC3E}">
+        <p14:creationId xmlns:p14="http://schemas.microsoft.com/office/powerpoint/2010/main" val="662694278"/>
+      </p:ext>
+    </p:extLst>
+  </p:cSld>
+  <p:clrMapOvr>
+    <a:masterClrMapping/>
+  </p:clrMapOvr>
+</p:sld>
+</file>
+
+<file path=ppt/slides/slide15.xml><?xml version="1.0" encoding="utf-8"?>
+<p:sld xmlns:a="http://schemas.openxmlformats.org/drawingml/2006/main" xmlns:r="http://schemas.openxmlformats.org/officeDocument/2006/relationships" xmlns:p="http://schemas.openxmlformats.org/presentationml/2006/main">
+  <p:cSld>
+    <p:spTree>
+      <p:nvGrpSpPr>
+        <p:cNvPr id="1" name=""/>
+        <p:cNvGrpSpPr/>
+        <p:nvPr/>
+      </p:nvGrpSpPr>
+      <p:grpSpPr>
+        <a:xfrm>
+          <a:off x="0" y="0"/>
+          <a:ext cx="0" cy="0"/>
+          <a:chOff x="0" y="0"/>
+          <a:chExt cx="0" cy="0"/>
+        </a:xfrm>
+      </p:grpSpPr>
+      <p:pic>
+        <p:nvPicPr>
+          <p:cNvPr id="4098" name="Picture 2"/>
+          <p:cNvPicPr>
+            <a:picLocks noChangeAspect="1" noChangeArrowheads="1"/>
+          </p:cNvPicPr>
+          <p:nvPr/>
+        </p:nvPicPr>
+        <p:blipFill>
+          <a:blip r:embed="rId3">
+            <a:extLst>
+              <a:ext uri="{28A0092B-C50C-407E-A947-70E740481C1C}">
+                <a14:useLocalDpi xmlns:a14="http://schemas.microsoft.com/office/drawing/2010/main" val="0"/>
+              </a:ext>
+            </a:extLst>
+          </a:blip>
+          <a:srcRect/>
+          <a:stretch>
+            <a:fillRect/>
+          </a:stretch>
+        </p:blipFill>
+        <p:spPr bwMode="auto">
+          <a:xfrm>
+            <a:off x="2691168" y="-131"/>
+            <a:ext cx="6882159" cy="6864890"/>
+          </a:xfrm>
+          <a:prstGeom prst="rect">
+            <a:avLst/>
+          </a:prstGeom>
+          <a:noFill/>
+          <a:ln>
+            <a:noFill/>
+          </a:ln>
+          <a:extLst>
+            <a:ext uri="{909E8E84-426E-40DD-AFC4-6F175D3DCCD1}">
+              <a14:hiddenFill xmlns:a14="http://schemas.microsoft.com/office/drawing/2010/main">
+                <a:solidFill>
+                  <a:schemeClr val="accent1"/>
+                </a:solidFill>
+              </a14:hiddenFill>
+            </a:ext>
+            <a:ext uri="{91240B29-F687-4F45-9708-019B960494DF}">
+              <a14:hiddenLine xmlns:a14="http://schemas.microsoft.com/office/drawing/2010/main" w="9525">
+                <a:solidFill>
+                  <a:schemeClr val="tx1"/>
+                </a:solidFill>
+                <a:miter lim="800000"/>
+                <a:headEnd/>
+                <a:tailEnd/>
+              </a14:hiddenLine>
+            </a:ext>
+          </a:extLst>
+        </p:spPr>
+      </p:pic>
+    </p:spTree>
+    <p:extLst>
+      <p:ext uri="{BB962C8B-B14F-4D97-AF65-F5344CB8AC3E}">
+        <p14:creationId xmlns:p14="http://schemas.microsoft.com/office/powerpoint/2010/main" val="1617461481"/>
+      </p:ext>
+    </p:extLst>
+  </p:cSld>
+  <p:clrMapOvr>
+    <a:masterClrMapping/>
+  </p:clrMapOvr>
+</p:sld>
+</file>
+
+<file path=ppt/slides/slide16.xml><?xml version="1.0" encoding="utf-8"?>
+<p:sld xmlns:a="http://schemas.openxmlformats.org/drawingml/2006/main" xmlns:r="http://schemas.openxmlformats.org/officeDocument/2006/relationships" xmlns:p="http://schemas.openxmlformats.org/presentationml/2006/main">
+  <p:cSld>
+    <p:spTree>
+      <p:nvGrpSpPr>
+        <p:cNvPr id="1" name=""/>
+        <p:cNvGrpSpPr/>
+        <p:nvPr/>
+      </p:nvGrpSpPr>
+      <p:grpSpPr>
+        <a:xfrm>
+          <a:off x="0" y="0"/>
+          <a:ext cx="0" cy="0"/>
+          <a:chOff x="0" y="0"/>
+          <a:chExt cx="0" cy="0"/>
+        </a:xfrm>
+      </p:grpSpPr>
+      <p:sp>
+        <p:nvSpPr>
+          <p:cNvPr id="2" name="Title 1"/>
+          <p:cNvSpPr>
+            <a:spLocks noGrp="1"/>
+          </p:cNvSpPr>
+          <p:nvPr>
+            <p:ph type="title"/>
+          </p:nvPr>
+        </p:nvSpPr>
+        <p:spPr>
+          <a:xfrm>
+            <a:off x="838200" y="139456"/>
+            <a:ext cx="10515600" cy="1325563"/>
+          </a:xfrm>
+        </p:spPr>
+        <p:txBody>
+          <a:bodyPr/>
+          <a:lstStyle/>
+          <a:p>
+            <a:r>
+              <a:rPr lang="en-US" dirty="0"/>
+              <a:t>“</a:t>
+            </a:r>
+            <a:r>
+              <a:rPr lang="en-US" dirty="0" err="1"/>
+              <a:t>dopar</a:t>
+            </a:r>
+            <a:r>
+              <a:rPr lang="en-US" dirty="0"/>
+              <a:t>” – does need some overhead</a:t>
+            </a:r>
+          </a:p>
+        </p:txBody>
+      </p:sp>
+      <p:pic>
+        <p:nvPicPr>
+          <p:cNvPr id="4" name="Picture 3"/>
+          <p:cNvPicPr>
+            <a:picLocks noChangeAspect="1"/>
+          </p:cNvPicPr>
+          <p:nvPr/>
+        </p:nvPicPr>
+        <p:blipFill>
+          <a:blip r:embed="rId2"/>
+          <a:stretch>
+            <a:fillRect/>
+          </a:stretch>
+        </p:blipFill>
+        <p:spPr>
+          <a:xfrm>
+            <a:off x="1842355" y="1266825"/>
+            <a:ext cx="8296275" cy="5591175"/>
+          </a:xfrm>
+          <a:prstGeom prst="rect">
+            <a:avLst/>
+          </a:prstGeom>
+        </p:spPr>
+      </p:pic>
+    </p:spTree>
+    <p:extLst>
+      <p:ext uri="{BB962C8B-B14F-4D97-AF65-F5344CB8AC3E}">
+        <p14:creationId xmlns:p14="http://schemas.microsoft.com/office/powerpoint/2010/main" val="1827107441"/>
+      </p:ext>
+    </p:extLst>
+  </p:cSld>
+  <p:clrMapOvr>
+    <a:masterClrMapping/>
+  </p:clrMapOvr>
 </p:sld>
 </file>
 

</xml_diff>